<commit_message>
Corrections to final ppt
</commit_message>
<xml_diff>
--- a/Project_Final_PPT.pptx
+++ b/Project_Final_PPT.pptx
@@ -5,7 +5,7 @@
     <p:sldMasterId id="2147483741" r:id="rId1"/>
   </p:sldMasterIdLst>
   <p:notesMasterIdLst>
-    <p:notesMasterId r:id="rId17"/>
+    <p:notesMasterId r:id="rId18"/>
   </p:notesMasterIdLst>
   <p:sldIdLst>
     <p:sldId id="256" r:id="rId2"/>
@@ -15,14 +15,15 @@
     <p:sldId id="280" r:id="rId6"/>
     <p:sldId id="281" r:id="rId7"/>
     <p:sldId id="279" r:id="rId8"/>
-    <p:sldId id="260" r:id="rId9"/>
-    <p:sldId id="267" r:id="rId10"/>
-    <p:sldId id="268" r:id="rId11"/>
-    <p:sldId id="282" r:id="rId12"/>
-    <p:sldId id="261" r:id="rId13"/>
-    <p:sldId id="262" r:id="rId14"/>
-    <p:sldId id="263" r:id="rId15"/>
-    <p:sldId id="283" r:id="rId16"/>
+    <p:sldId id="284" r:id="rId9"/>
+    <p:sldId id="260" r:id="rId10"/>
+    <p:sldId id="267" r:id="rId11"/>
+    <p:sldId id="268" r:id="rId12"/>
+    <p:sldId id="282" r:id="rId13"/>
+    <p:sldId id="261" r:id="rId14"/>
+    <p:sldId id="262" r:id="rId15"/>
+    <p:sldId id="263" r:id="rId16"/>
+    <p:sldId id="283" r:id="rId17"/>
   </p:sldIdLst>
   <p:sldSz cx="12192000" cy="6858000"/>
   <p:notesSz cx="6858000" cy="9144000"/>
@@ -969,7 +970,7 @@
           <a:p>
             <a:fld id="{A82001B1-504F-FA42-8F15-303BFD448CAD}" type="slidenum">
               <a:rPr lang="en-US" smtClean="0"/>
-              <a:t>8</a:t>
+              <a:t>9</a:t>
             </a:fld>
             <a:endParaRPr lang="en-US"/>
           </a:p>
@@ -1076,7 +1077,7 @@
           <a:p>
             <a:fld id="{A82001B1-504F-FA42-8F15-303BFD448CAD}" type="slidenum">
               <a:rPr lang="en-US" smtClean="0"/>
-              <a:t>9</a:t>
+              <a:t>10</a:t>
             </a:fld>
             <a:endParaRPr lang="en-US"/>
           </a:p>
@@ -1183,7 +1184,7 @@
           <a:p>
             <a:fld id="{A82001B1-504F-FA42-8F15-303BFD448CAD}" type="slidenum">
               <a:rPr lang="en-US" smtClean="0"/>
-              <a:t>10</a:t>
+              <a:t>11</a:t>
             </a:fld>
             <a:endParaRPr lang="en-US"/>
           </a:p>
@@ -1271,7 +1272,7 @@
           <a:p>
             <a:fld id="{A82001B1-504F-FA42-8F15-303BFD448CAD}" type="slidenum">
               <a:rPr lang="en-US" smtClean="0"/>
-              <a:t>12</a:t>
+              <a:t>13</a:t>
             </a:fld>
             <a:endParaRPr lang="en-US"/>
           </a:p>
@@ -1358,7 +1359,7 @@
           <a:p>
             <a:fld id="{A82001B1-504F-FA42-8F15-303BFD448CAD}" type="slidenum">
               <a:rPr lang="en-US" smtClean="0"/>
-              <a:t>13</a:t>
+              <a:t>14</a:t>
             </a:fld>
             <a:endParaRPr lang="en-US"/>
           </a:p>
@@ -1445,7 +1446,7 @@
           <a:p>
             <a:fld id="{A82001B1-504F-FA42-8F15-303BFD448CAD}" type="slidenum">
               <a:rPr lang="en-US" smtClean="0"/>
-              <a:t>14</a:t>
+              <a:t>15</a:t>
             </a:fld>
             <a:endParaRPr lang="en-US"/>
           </a:p>
@@ -7264,10 +7265,566 @@
       </p:transition>
     </mc:Fallback>
   </mc:AlternateContent>
+  <p:timing>
+    <p:tnLst>
+      <p:par>
+        <p:cTn id="1" dur="indefinite" restart="never" nodeType="tmRoot"/>
+      </p:par>
+    </p:tnLst>
+  </p:timing>
 </p:sld>
 </file>
 
 <file path=ppt/slides/slide10.xml><?xml version="1.0" encoding="utf-8"?>
+<p:sld xmlns:a="http://schemas.openxmlformats.org/drawingml/2006/main" xmlns:r="http://schemas.openxmlformats.org/officeDocument/2006/relationships" xmlns:p="http://schemas.openxmlformats.org/presentationml/2006/main">
+  <p:cSld>
+    <p:spTree>
+      <p:nvGrpSpPr>
+        <p:cNvPr id="1" name=""/>
+        <p:cNvGrpSpPr/>
+        <p:nvPr/>
+      </p:nvGrpSpPr>
+      <p:grpSpPr>
+        <a:xfrm>
+          <a:off x="0" y="0"/>
+          <a:ext cx="0" cy="0"/>
+          <a:chOff x="0" y="0"/>
+          <a:chExt cx="0" cy="0"/>
+        </a:xfrm>
+      </p:grpSpPr>
+      <p:sp>
+        <p:nvSpPr>
+          <p:cNvPr id="2" name="Title 1"/>
+          <p:cNvSpPr>
+            <a:spLocks noGrp="1"/>
+          </p:cNvSpPr>
+          <p:nvPr>
+            <p:ph type="title"/>
+          </p:nvPr>
+        </p:nvSpPr>
+        <p:spPr>
+          <a:xfrm>
+            <a:off x="821267" y="2566459"/>
+            <a:ext cx="10515600" cy="1325563"/>
+          </a:xfrm>
+        </p:spPr>
+        <p:txBody>
+          <a:bodyPr>
+            <a:normAutofit fontScale="90000"/>
+          </a:bodyPr>
+          <a:lstStyle/>
+          <a:p>
+            <a:pPr algn="ctr"/>
+            <a:r>
+              <a:rPr lang="en-US" dirty="0">
+                <a:solidFill>
+                  <a:schemeClr val="bg2">
+                    <a:lumMod val="75000"/>
+                  </a:schemeClr>
+                </a:solidFill>
+              </a:rPr>
+              <a:t>Do lighting conditions have an effect on accidents and severity? </a:t>
+            </a:r>
+          </a:p>
+        </p:txBody>
+      </p:sp>
+      <p:pic>
+        <p:nvPicPr>
+          <p:cNvPr id="5" name="Picture 4"/>
+          <p:cNvPicPr>
+            <a:picLocks noChangeAspect="1"/>
+          </p:cNvPicPr>
+          <p:nvPr/>
+        </p:nvPicPr>
+        <p:blipFill>
+          <a:blip r:embed="rId3">
+            <a:extLst>
+              <a:ext uri="{28A0092B-C50C-407E-A947-70E740481C1C}">
+                <a14:useLocalDpi xmlns:a14="http://schemas.microsoft.com/office/drawing/2010/main" val="0"/>
+              </a:ext>
+            </a:extLst>
+          </a:blip>
+          <a:stretch>
+            <a:fillRect/>
+          </a:stretch>
+        </p:blipFill>
+        <p:spPr>
+          <a:xfrm>
+            <a:off x="935567" y="0"/>
+            <a:ext cx="10287000" cy="6858000"/>
+          </a:xfrm>
+          <a:prstGeom prst="rect">
+            <a:avLst/>
+          </a:prstGeom>
+        </p:spPr>
+      </p:pic>
+      <p:pic>
+        <p:nvPicPr>
+          <p:cNvPr id="6" name="Picture 5"/>
+          <p:cNvPicPr>
+            <a:picLocks noChangeAspect="1"/>
+          </p:cNvPicPr>
+          <p:nvPr/>
+        </p:nvPicPr>
+        <p:blipFill>
+          <a:blip r:embed="rId4">
+            <a:extLst>
+              <a:ext uri="{28A0092B-C50C-407E-A947-70E740481C1C}">
+                <a14:useLocalDpi xmlns:a14="http://schemas.microsoft.com/office/drawing/2010/main" val="0"/>
+              </a:ext>
+            </a:extLst>
+          </a:blip>
+          <a:stretch>
+            <a:fillRect/>
+          </a:stretch>
+        </p:blipFill>
+        <p:spPr>
+          <a:xfrm>
+            <a:off x="520700" y="660400"/>
+            <a:ext cx="11150600" cy="5537200"/>
+          </a:xfrm>
+          <a:prstGeom prst="rect">
+            <a:avLst/>
+          </a:prstGeom>
+        </p:spPr>
+      </p:pic>
+      <p:pic>
+        <p:nvPicPr>
+          <p:cNvPr id="7" name="Picture 6"/>
+          <p:cNvPicPr>
+            <a:picLocks noChangeAspect="1"/>
+          </p:cNvPicPr>
+          <p:nvPr/>
+        </p:nvPicPr>
+        <p:blipFill>
+          <a:blip r:embed="rId5">
+            <a:extLst>
+              <a:ext uri="{28A0092B-C50C-407E-A947-70E740481C1C}">
+                <a14:useLocalDpi xmlns:a14="http://schemas.microsoft.com/office/drawing/2010/main" val="0"/>
+              </a:ext>
+            </a:extLst>
+          </a:blip>
+          <a:stretch>
+            <a:fillRect/>
+          </a:stretch>
+        </p:blipFill>
+        <p:spPr>
+          <a:xfrm>
+            <a:off x="666750" y="1771650"/>
+            <a:ext cx="10858500" cy="3314700"/>
+          </a:xfrm>
+          <a:prstGeom prst="rect">
+            <a:avLst/>
+          </a:prstGeom>
+        </p:spPr>
+      </p:pic>
+    </p:spTree>
+    <p:extLst>
+      <p:ext uri="{BB962C8B-B14F-4D97-AF65-F5344CB8AC3E}">
+        <p14:creationId xmlns:p14="http://schemas.microsoft.com/office/powerpoint/2010/main" val="1476045322"/>
+      </p:ext>
+    </p:extLst>
+  </p:cSld>
+  <p:clrMapOvr>
+    <a:masterClrMapping/>
+  </p:clrMapOvr>
+  <mc:AlternateContent xmlns:mc="http://schemas.openxmlformats.org/markup-compatibility/2006" xmlns:p14="http://schemas.microsoft.com/office/powerpoint/2010/main">
+    <mc:Choice Requires="p14">
+      <p:transition spd="med" p14:dur="700">
+        <p:fade/>
+      </p:transition>
+    </mc:Choice>
+    <mc:Fallback xmlns="">
+      <p:transition spd="med">
+        <p:fade/>
+      </p:transition>
+    </mc:Fallback>
+  </mc:AlternateContent>
+  <p:timing>
+    <p:tnLst>
+      <p:par>
+        <p:cTn id="1" dur="indefinite" restart="never" nodeType="tmRoot">
+          <p:childTnLst>
+            <p:seq concurrent="1" nextAc="seek">
+              <p:cTn id="2" dur="indefinite" nodeType="mainSeq">
+                <p:childTnLst>
+                  <p:par>
+                    <p:cTn id="3" fill="hold">
+                      <p:stCondLst>
+                        <p:cond delay="indefinite"/>
+                        <p:cond evt="onBegin" delay="0">
+                          <p:tn val="2"/>
+                        </p:cond>
+                      </p:stCondLst>
+                      <p:childTnLst>
+                        <p:par>
+                          <p:cTn id="4" fill="hold">
+                            <p:stCondLst>
+                              <p:cond delay="0"/>
+                            </p:stCondLst>
+                            <p:childTnLst>
+                              <p:par>
+                                <p:cTn id="5" presetID="9" presetClass="entr" presetSubtype="0" fill="hold" grpId="0" nodeType="withEffect">
+                                  <p:stCondLst>
+                                    <p:cond delay="0"/>
+                                  </p:stCondLst>
+                                  <p:childTnLst>
+                                    <p:set>
+                                      <p:cBhvr>
+                                        <p:cTn id="6" dur="1" fill="hold">
+                                          <p:stCondLst>
+                                            <p:cond delay="0"/>
+                                          </p:stCondLst>
+                                        </p:cTn>
+                                        <p:tgtEl>
+                                          <p:spTgt spid="2"/>
+                                        </p:tgtEl>
+                                        <p:attrNameLst>
+                                          <p:attrName>style.visibility</p:attrName>
+                                        </p:attrNameLst>
+                                      </p:cBhvr>
+                                      <p:to>
+                                        <p:strVal val="visible"/>
+                                      </p:to>
+                                    </p:set>
+                                    <p:animEffect transition="in" filter="dissolve">
+                                      <p:cBhvr>
+                                        <p:cTn id="7" dur="500"/>
+                                        <p:tgtEl>
+                                          <p:spTgt spid="2"/>
+                                        </p:tgtEl>
+                                      </p:cBhvr>
+                                    </p:animEffect>
+                                  </p:childTnLst>
+                                </p:cTn>
+                              </p:par>
+                            </p:childTnLst>
+                          </p:cTn>
+                        </p:par>
+                      </p:childTnLst>
+                    </p:cTn>
+                  </p:par>
+                  <p:par>
+                    <p:cTn id="8" fill="hold">
+                      <p:stCondLst>
+                        <p:cond delay="indefinite"/>
+                      </p:stCondLst>
+                      <p:childTnLst>
+                        <p:par>
+                          <p:cTn id="9" fill="hold">
+                            <p:stCondLst>
+                              <p:cond delay="0"/>
+                            </p:stCondLst>
+                            <p:childTnLst>
+                              <p:par>
+                                <p:cTn id="10" presetID="9" presetClass="exit" presetSubtype="0" fill="hold" grpId="1" nodeType="clickEffect">
+                                  <p:stCondLst>
+                                    <p:cond delay="0"/>
+                                  </p:stCondLst>
+                                  <p:childTnLst>
+                                    <p:animEffect transition="out" filter="dissolve">
+                                      <p:cBhvr>
+                                        <p:cTn id="11" dur="500"/>
+                                        <p:tgtEl>
+                                          <p:spTgt spid="2"/>
+                                        </p:tgtEl>
+                                      </p:cBhvr>
+                                    </p:animEffect>
+                                    <p:set>
+                                      <p:cBhvr>
+                                        <p:cTn id="12" dur="1" fill="hold">
+                                          <p:stCondLst>
+                                            <p:cond delay="499"/>
+                                          </p:stCondLst>
+                                        </p:cTn>
+                                        <p:tgtEl>
+                                          <p:spTgt spid="2"/>
+                                        </p:tgtEl>
+                                        <p:attrNameLst>
+                                          <p:attrName>style.visibility</p:attrName>
+                                        </p:attrNameLst>
+                                      </p:cBhvr>
+                                      <p:to>
+                                        <p:strVal val="hidden"/>
+                                      </p:to>
+                                    </p:set>
+                                  </p:childTnLst>
+                                </p:cTn>
+                              </p:par>
+                            </p:childTnLst>
+                          </p:cTn>
+                        </p:par>
+                        <p:par>
+                          <p:cTn id="13" fill="hold">
+                            <p:stCondLst>
+                              <p:cond delay="500"/>
+                            </p:stCondLst>
+                            <p:childTnLst>
+                              <p:par>
+                                <p:cTn id="14" presetID="9" presetClass="entr" presetSubtype="0" fill="hold" nodeType="afterEffect">
+                                  <p:stCondLst>
+                                    <p:cond delay="0"/>
+                                  </p:stCondLst>
+                                  <p:childTnLst>
+                                    <p:set>
+                                      <p:cBhvr>
+                                        <p:cTn id="15" dur="1" fill="hold">
+                                          <p:stCondLst>
+                                            <p:cond delay="0"/>
+                                          </p:stCondLst>
+                                        </p:cTn>
+                                        <p:tgtEl>
+                                          <p:spTgt spid="5"/>
+                                        </p:tgtEl>
+                                        <p:attrNameLst>
+                                          <p:attrName>style.visibility</p:attrName>
+                                        </p:attrNameLst>
+                                      </p:cBhvr>
+                                      <p:to>
+                                        <p:strVal val="visible"/>
+                                      </p:to>
+                                    </p:set>
+                                    <p:animEffect transition="in" filter="dissolve">
+                                      <p:cBhvr>
+                                        <p:cTn id="16" dur="500"/>
+                                        <p:tgtEl>
+                                          <p:spTgt spid="5"/>
+                                        </p:tgtEl>
+                                      </p:cBhvr>
+                                    </p:animEffect>
+                                  </p:childTnLst>
+                                </p:cTn>
+                              </p:par>
+                            </p:childTnLst>
+                          </p:cTn>
+                        </p:par>
+                      </p:childTnLst>
+                    </p:cTn>
+                  </p:par>
+                  <p:par>
+                    <p:cTn id="17" fill="hold">
+                      <p:stCondLst>
+                        <p:cond delay="indefinite"/>
+                      </p:stCondLst>
+                      <p:childTnLst>
+                        <p:par>
+                          <p:cTn id="18" fill="hold">
+                            <p:stCondLst>
+                              <p:cond delay="0"/>
+                            </p:stCondLst>
+                            <p:childTnLst>
+                              <p:par>
+                                <p:cTn id="19" presetID="9" presetClass="exit" presetSubtype="0" fill="hold" nodeType="clickEffect">
+                                  <p:stCondLst>
+                                    <p:cond delay="0"/>
+                                  </p:stCondLst>
+                                  <p:childTnLst>
+                                    <p:animEffect transition="out" filter="dissolve">
+                                      <p:cBhvr>
+                                        <p:cTn id="20" dur="500"/>
+                                        <p:tgtEl>
+                                          <p:spTgt spid="5"/>
+                                        </p:tgtEl>
+                                      </p:cBhvr>
+                                    </p:animEffect>
+                                    <p:set>
+                                      <p:cBhvr>
+                                        <p:cTn id="21" dur="1" fill="hold">
+                                          <p:stCondLst>
+                                            <p:cond delay="499"/>
+                                          </p:stCondLst>
+                                        </p:cTn>
+                                        <p:tgtEl>
+                                          <p:spTgt spid="5"/>
+                                        </p:tgtEl>
+                                        <p:attrNameLst>
+                                          <p:attrName>style.visibility</p:attrName>
+                                        </p:attrNameLst>
+                                      </p:cBhvr>
+                                      <p:to>
+                                        <p:strVal val="hidden"/>
+                                      </p:to>
+                                    </p:set>
+                                  </p:childTnLst>
+                                </p:cTn>
+                              </p:par>
+                            </p:childTnLst>
+                          </p:cTn>
+                        </p:par>
+                        <p:par>
+                          <p:cTn id="22" fill="hold">
+                            <p:stCondLst>
+                              <p:cond delay="500"/>
+                            </p:stCondLst>
+                            <p:childTnLst>
+                              <p:par>
+                                <p:cTn id="23" presetID="9" presetClass="entr" presetSubtype="0" fill="hold" nodeType="afterEffect">
+                                  <p:stCondLst>
+                                    <p:cond delay="0"/>
+                                  </p:stCondLst>
+                                  <p:childTnLst>
+                                    <p:set>
+                                      <p:cBhvr>
+                                        <p:cTn id="24" dur="1" fill="hold">
+                                          <p:stCondLst>
+                                            <p:cond delay="0"/>
+                                          </p:stCondLst>
+                                        </p:cTn>
+                                        <p:tgtEl>
+                                          <p:spTgt spid="6"/>
+                                        </p:tgtEl>
+                                        <p:attrNameLst>
+                                          <p:attrName>style.visibility</p:attrName>
+                                        </p:attrNameLst>
+                                      </p:cBhvr>
+                                      <p:to>
+                                        <p:strVal val="visible"/>
+                                      </p:to>
+                                    </p:set>
+                                    <p:animEffect transition="in" filter="dissolve">
+                                      <p:cBhvr>
+                                        <p:cTn id="25" dur="500"/>
+                                        <p:tgtEl>
+                                          <p:spTgt spid="6"/>
+                                        </p:tgtEl>
+                                      </p:cBhvr>
+                                    </p:animEffect>
+                                  </p:childTnLst>
+                                </p:cTn>
+                              </p:par>
+                            </p:childTnLst>
+                          </p:cTn>
+                        </p:par>
+                      </p:childTnLst>
+                    </p:cTn>
+                  </p:par>
+                  <p:par>
+                    <p:cTn id="26" fill="hold">
+                      <p:stCondLst>
+                        <p:cond delay="indefinite"/>
+                      </p:stCondLst>
+                      <p:childTnLst>
+                        <p:par>
+                          <p:cTn id="27" fill="hold">
+                            <p:stCondLst>
+                              <p:cond delay="0"/>
+                            </p:stCondLst>
+                            <p:childTnLst>
+                              <p:par>
+                                <p:cTn id="28" presetID="9" presetClass="exit" presetSubtype="0" fill="hold" nodeType="clickEffect">
+                                  <p:stCondLst>
+                                    <p:cond delay="0"/>
+                                  </p:stCondLst>
+                                  <p:childTnLst>
+                                    <p:animEffect transition="out" filter="dissolve">
+                                      <p:cBhvr>
+                                        <p:cTn id="29" dur="500"/>
+                                        <p:tgtEl>
+                                          <p:spTgt spid="6"/>
+                                        </p:tgtEl>
+                                      </p:cBhvr>
+                                    </p:animEffect>
+                                    <p:set>
+                                      <p:cBhvr>
+                                        <p:cTn id="30" dur="1" fill="hold">
+                                          <p:stCondLst>
+                                            <p:cond delay="499"/>
+                                          </p:stCondLst>
+                                        </p:cTn>
+                                        <p:tgtEl>
+                                          <p:spTgt spid="6"/>
+                                        </p:tgtEl>
+                                        <p:attrNameLst>
+                                          <p:attrName>style.visibility</p:attrName>
+                                        </p:attrNameLst>
+                                      </p:cBhvr>
+                                      <p:to>
+                                        <p:strVal val="hidden"/>
+                                      </p:to>
+                                    </p:set>
+                                  </p:childTnLst>
+                                </p:cTn>
+                              </p:par>
+                            </p:childTnLst>
+                          </p:cTn>
+                        </p:par>
+                        <p:par>
+                          <p:cTn id="31" fill="hold">
+                            <p:stCondLst>
+                              <p:cond delay="500"/>
+                            </p:stCondLst>
+                            <p:childTnLst>
+                              <p:par>
+                                <p:cTn id="32" presetID="9" presetClass="entr" presetSubtype="0" fill="hold" nodeType="afterEffect">
+                                  <p:stCondLst>
+                                    <p:cond delay="0"/>
+                                  </p:stCondLst>
+                                  <p:childTnLst>
+                                    <p:set>
+                                      <p:cBhvr>
+                                        <p:cTn id="33" dur="1" fill="hold">
+                                          <p:stCondLst>
+                                            <p:cond delay="0"/>
+                                          </p:stCondLst>
+                                        </p:cTn>
+                                        <p:tgtEl>
+                                          <p:spTgt spid="7"/>
+                                        </p:tgtEl>
+                                        <p:attrNameLst>
+                                          <p:attrName>style.visibility</p:attrName>
+                                        </p:attrNameLst>
+                                      </p:cBhvr>
+                                      <p:to>
+                                        <p:strVal val="visible"/>
+                                      </p:to>
+                                    </p:set>
+                                    <p:animEffect transition="in" filter="dissolve">
+                                      <p:cBhvr>
+                                        <p:cTn id="34" dur="500"/>
+                                        <p:tgtEl>
+                                          <p:spTgt spid="7"/>
+                                        </p:tgtEl>
+                                      </p:cBhvr>
+                                    </p:animEffect>
+                                  </p:childTnLst>
+                                </p:cTn>
+                              </p:par>
+                            </p:childTnLst>
+                          </p:cTn>
+                        </p:par>
+                      </p:childTnLst>
+                    </p:cTn>
+                  </p:par>
+                </p:childTnLst>
+              </p:cTn>
+              <p:prevCondLst>
+                <p:cond evt="onPrev" delay="0">
+                  <p:tgtEl>
+                    <p:sldTgt/>
+                  </p:tgtEl>
+                </p:cond>
+              </p:prevCondLst>
+              <p:nextCondLst>
+                <p:cond evt="onNext" delay="0">
+                  <p:tgtEl>
+                    <p:sldTgt/>
+                  </p:tgtEl>
+                </p:cond>
+              </p:nextCondLst>
+            </p:seq>
+          </p:childTnLst>
+        </p:cTn>
+      </p:par>
+    </p:tnLst>
+    <p:bldLst>
+      <p:bldP spid="2" grpId="0"/>
+      <p:bldP spid="2" grpId="1"/>
+    </p:bldLst>
+  </p:timing>
+</p:sld>
+</file>
+
+<file path=ppt/slides/slide11.xml><?xml version="1.0" encoding="utf-8"?>
 <p:sld xmlns:a="http://schemas.openxmlformats.org/drawingml/2006/main" xmlns:r="http://schemas.openxmlformats.org/officeDocument/2006/relationships" xmlns:p="http://schemas.openxmlformats.org/presentationml/2006/main">
   <p:cSld>
     <p:spTree>
@@ -7943,7 +8500,7 @@
 </p:sld>
 </file>
 
-<file path=ppt/slides/slide11.xml><?xml version="1.0" encoding="utf-8"?>
+<file path=ppt/slides/slide12.xml><?xml version="1.0" encoding="utf-8"?>
 <p:sld xmlns:a="http://schemas.openxmlformats.org/drawingml/2006/main" xmlns:r="http://schemas.openxmlformats.org/officeDocument/2006/relationships" xmlns:p="http://schemas.openxmlformats.org/presentationml/2006/main">
   <p:cSld>
     <p:spTree>
@@ -8605,7 +9162,7 @@
 </p:sld>
 </file>
 
-<file path=ppt/slides/slide12.xml><?xml version="1.0" encoding="utf-8"?>
+<file path=ppt/slides/slide13.xml><?xml version="1.0" encoding="utf-8"?>
 <p:sld xmlns:a="http://schemas.openxmlformats.org/drawingml/2006/main" xmlns:r="http://schemas.openxmlformats.org/officeDocument/2006/relationships" xmlns:p="http://schemas.openxmlformats.org/presentationml/2006/main">
   <p:cSld>
     <p:spTree>
@@ -9154,7 +9711,7 @@
 </p:sld>
 </file>
 
-<file path=ppt/slides/slide13.xml><?xml version="1.0" encoding="utf-8"?>
+<file path=ppt/slides/slide14.xml><?xml version="1.0" encoding="utf-8"?>
 <p:sld xmlns:a="http://schemas.openxmlformats.org/drawingml/2006/main" xmlns:r="http://schemas.openxmlformats.org/officeDocument/2006/relationships" xmlns:p="http://schemas.openxmlformats.org/presentationml/2006/main">
   <p:cSld>
     <p:spTree>
@@ -9573,7 +10130,7 @@
 </p:sld>
 </file>
 
-<file path=ppt/slides/slide14.xml><?xml version="1.0" encoding="utf-8"?>
+<file path=ppt/slides/slide15.xml><?xml version="1.0" encoding="utf-8"?>
 <p:sld xmlns:a="http://schemas.openxmlformats.org/drawingml/2006/main" xmlns:r="http://schemas.openxmlformats.org/officeDocument/2006/relationships" xmlns:p="http://schemas.openxmlformats.org/presentationml/2006/main">
   <p:cSld>
     <p:spTree>
@@ -9620,11 +10177,6 @@
               </a:rPr>
               <a:t>Which types of vehicles have the highest number of accidents and worst severity?</a:t>
             </a:r>
-            <a:endParaRPr lang="en-US" sz="4800" dirty="0">
-              <a:solidFill>
-                <a:schemeClr val="bg2"/>
-              </a:solidFill>
-            </a:endParaRPr>
           </a:p>
         </p:txBody>
       </p:sp>
@@ -9870,7 +10422,7 @@
 </p:sld>
 </file>
 
-<file path=ppt/slides/slide15.xml><?xml version="1.0" encoding="utf-8"?>
+<file path=ppt/slides/slide16.xml><?xml version="1.0" encoding="utf-8"?>
 <p:sld xmlns:a="http://schemas.openxmlformats.org/drawingml/2006/main" xmlns:r="http://schemas.openxmlformats.org/officeDocument/2006/relationships" xmlns:p="http://schemas.openxmlformats.org/presentationml/2006/main">
   <p:cSld>
     <p:spTree>
@@ -13571,38 +14123,20 @@
           <a:lstStyle/>
           <a:p>
             <a:r>
+              <a:rPr lang="en-US" dirty="0" smtClean="0">
+                <a:solidFill>
+                  <a:schemeClr val="bg2"/>
+                </a:solidFill>
+              </a:rPr>
+              <a:t>Of </a:t>
+            </a:r>
+            <a:r>
               <a:rPr lang="en-US" dirty="0">
                 <a:solidFill>
                   <a:schemeClr val="bg2"/>
                 </a:solidFill>
               </a:rPr>
-              <a:t>After cleaning the data </a:t>
-            </a:r>
-            <a:r>
-              <a:rPr lang="mr-IN" dirty="0">
-                <a:solidFill>
-                  <a:schemeClr val="bg2"/>
-                </a:solidFill>
-              </a:rPr>
-              <a:t>–</a:t>
-            </a:r>
-            <a:r>
-              <a:rPr lang="en-US" dirty="0">
-                <a:solidFill>
-                  <a:schemeClr val="bg2"/>
-                </a:solidFill>
-              </a:rPr>
-              <a:t> we needed to extract and combine what data we needed from each CSV file.</a:t>
-            </a:r>
-          </a:p>
-          <a:p>
-            <a:r>
-              <a:rPr lang="en-US" dirty="0">
-                <a:solidFill>
-                  <a:schemeClr val="bg2"/>
-                </a:solidFill>
-              </a:rPr>
-              <a:t>Of the 67 columns of data between the 3 Datasets, we extracted 27 columns for our analysis</a:t>
+              <a:t>the 67 columns of data between the 3 Datasets, we extracted 27 columns for our analysis</a:t>
             </a:r>
           </a:p>
           <a:p>
@@ -13740,30 +14274,21 @@
                             </p:childTnLst>
                           </p:cTn>
                         </p:par>
-                      </p:childTnLst>
-                    </p:cTn>
-                  </p:par>
-                  <p:par>
-                    <p:cTn id="12" fill="hold">
-                      <p:stCondLst>
-                        <p:cond delay="indefinite"/>
-                      </p:stCondLst>
-                      <p:childTnLst>
                         <p:par>
-                          <p:cTn id="13" fill="hold">
+                          <p:cTn id="12" fill="hold">
                             <p:stCondLst>
-                              <p:cond delay="0"/>
+                              <p:cond delay="1500"/>
                             </p:stCondLst>
                             <p:childTnLst>
                               <p:par>
-                                <p:cTn id="14" presetID="9" presetClass="entr" presetSubtype="0" fill="hold" grpId="0" nodeType="clickEffect">
+                                <p:cTn id="13" presetID="9" presetClass="entr" presetSubtype="0" fill="hold" grpId="0" nodeType="afterEffect">
                                   <p:stCondLst>
                                     <p:cond delay="0"/>
                                   </p:stCondLst>
                                   <p:childTnLst>
                                     <p:set>
                                       <p:cBhvr>
-                                        <p:cTn id="15" dur="1" fill="hold">
+                                        <p:cTn id="14" dur="1" fill="hold">
                                           <p:stCondLst>
                                             <p:cond delay="0"/>
                                           </p:stCondLst>
@@ -13785,7 +14310,7 @@
                                     </p:set>
                                     <p:animEffect transition="in" filter="dissolve">
                                       <p:cBhvr>
-                                        <p:cTn id="16" dur="1000"/>
+                                        <p:cTn id="15" dur="1000"/>
                                         <p:tgtEl>
                                           <p:spTgt spid="3">
                                             <p:txEl>
@@ -13805,36 +14330,162 @@
                     </p:cTn>
                   </p:par>
                   <p:par>
-                    <p:cTn id="17" fill="hold">
+                    <p:cTn id="16" fill="hold">
                       <p:stCondLst>
                         <p:cond delay="indefinite"/>
                       </p:stCondLst>
                       <p:childTnLst>
                         <p:par>
-                          <p:cTn id="18" fill="hold">
+                          <p:cTn id="17" fill="hold">
                             <p:stCondLst>
                               <p:cond delay="0"/>
                             </p:stCondLst>
                             <p:childTnLst>
                               <p:par>
-                                <p:cTn id="19" presetID="9" presetClass="entr" presetSubtype="0" fill="hold" grpId="0" nodeType="clickEffect">
+                                <p:cTn id="18" presetID="9" presetClass="exit" presetSubtype="0" fill="hold" grpId="1" nodeType="clickEffect">
+                                  <p:stCondLst>
+                                    <p:cond delay="0"/>
+                                  </p:stCondLst>
+                                  <p:childTnLst>
+                                    <p:animEffect transition="out" filter="dissolve">
+                                      <p:cBhvr>
+                                        <p:cTn id="19" dur="500"/>
+                                        <p:tgtEl>
+                                          <p:spTgt spid="2"/>
+                                        </p:tgtEl>
+                                      </p:cBhvr>
+                                    </p:animEffect>
+                                    <p:set>
+                                      <p:cBhvr>
+                                        <p:cTn id="20" dur="1" fill="hold">
+                                          <p:stCondLst>
+                                            <p:cond delay="499"/>
+                                          </p:stCondLst>
+                                        </p:cTn>
+                                        <p:tgtEl>
+                                          <p:spTgt spid="2"/>
+                                        </p:tgtEl>
+                                        <p:attrNameLst>
+                                          <p:attrName>style.visibility</p:attrName>
+                                        </p:attrNameLst>
+                                      </p:cBhvr>
+                                      <p:to>
+                                        <p:strVal val="hidden"/>
+                                      </p:to>
+                                    </p:set>
+                                  </p:childTnLst>
+                                </p:cTn>
+                              </p:par>
+                              <p:par>
+                                <p:cTn id="21" presetID="9" presetClass="exit" presetSubtype="0" fill="hold" grpId="1" nodeType="withEffect">
+                                  <p:stCondLst>
+                                    <p:cond delay="0"/>
+                                  </p:stCondLst>
+                                  <p:childTnLst>
+                                    <p:animEffect transition="out" filter="dissolve">
+                                      <p:cBhvr>
+                                        <p:cTn id="22" dur="500"/>
+                                        <p:tgtEl>
+                                          <p:spTgt spid="3">
+                                            <p:txEl>
+                                              <p:pRg st="0" end="0"/>
+                                            </p:txEl>
+                                          </p:spTgt>
+                                        </p:tgtEl>
+                                      </p:cBhvr>
+                                    </p:animEffect>
+                                    <p:set>
+                                      <p:cBhvr>
+                                        <p:cTn id="23" dur="1" fill="hold">
+                                          <p:stCondLst>
+                                            <p:cond delay="499"/>
+                                          </p:stCondLst>
+                                        </p:cTn>
+                                        <p:tgtEl>
+                                          <p:spTgt spid="3">
+                                            <p:txEl>
+                                              <p:pRg st="0" end="0"/>
+                                            </p:txEl>
+                                          </p:spTgt>
+                                        </p:tgtEl>
+                                        <p:attrNameLst>
+                                          <p:attrName>style.visibility</p:attrName>
+                                        </p:attrNameLst>
+                                      </p:cBhvr>
+                                      <p:to>
+                                        <p:strVal val="hidden"/>
+                                      </p:to>
+                                    </p:set>
+                                  </p:childTnLst>
+                                </p:cTn>
+                              </p:par>
+                              <p:par>
+                                <p:cTn id="24" presetID="9" presetClass="exit" presetSubtype="0" fill="hold" grpId="1" nodeType="withEffect">
+                                  <p:stCondLst>
+                                    <p:cond delay="0"/>
+                                  </p:stCondLst>
+                                  <p:childTnLst>
+                                    <p:animEffect transition="out" filter="dissolve">
+                                      <p:cBhvr>
+                                        <p:cTn id="25" dur="500"/>
+                                        <p:tgtEl>
+                                          <p:spTgt spid="3">
+                                            <p:txEl>
+                                              <p:pRg st="1" end="1"/>
+                                            </p:txEl>
+                                          </p:spTgt>
+                                        </p:tgtEl>
+                                      </p:cBhvr>
+                                    </p:animEffect>
+                                    <p:set>
+                                      <p:cBhvr>
+                                        <p:cTn id="26" dur="1" fill="hold">
+                                          <p:stCondLst>
+                                            <p:cond delay="499"/>
+                                          </p:stCondLst>
+                                        </p:cTn>
+                                        <p:tgtEl>
+                                          <p:spTgt spid="3">
+                                            <p:txEl>
+                                              <p:pRg st="1" end="1"/>
+                                            </p:txEl>
+                                          </p:spTgt>
+                                        </p:tgtEl>
+                                        <p:attrNameLst>
+                                          <p:attrName>style.visibility</p:attrName>
+                                        </p:attrNameLst>
+                                      </p:cBhvr>
+                                      <p:to>
+                                        <p:strVal val="hidden"/>
+                                      </p:to>
+                                    </p:set>
+                                  </p:childTnLst>
+                                </p:cTn>
+                              </p:par>
+                            </p:childTnLst>
+                          </p:cTn>
+                        </p:par>
+                        <p:par>
+                          <p:cTn id="27" fill="hold">
+                            <p:stCondLst>
+                              <p:cond delay="500"/>
+                            </p:stCondLst>
+                            <p:childTnLst>
+                              <p:par>
+                                <p:cTn id="28" presetID="9" presetClass="entr" presetSubtype="0" fill="hold" nodeType="afterEffect">
                                   <p:stCondLst>
                                     <p:cond delay="0"/>
                                   </p:stCondLst>
                                   <p:childTnLst>
                                     <p:set>
                                       <p:cBhvr>
-                                        <p:cTn id="20" dur="1" fill="hold">
+                                        <p:cTn id="29" dur="1" fill="hold">
                                           <p:stCondLst>
                                             <p:cond delay="0"/>
                                           </p:stCondLst>
                                         </p:cTn>
                                         <p:tgtEl>
-                                          <p:spTgt spid="3">
-                                            <p:txEl>
-                                              <p:pRg st="2" end="2"/>
-                                            </p:txEl>
-                                          </p:spTgt>
+                                          <p:spTgt spid="5"/>
                                         </p:tgtEl>
                                         <p:attrNameLst>
                                           <p:attrName>style.visibility</p:attrName>
@@ -13846,13 +14497,9 @@
                                     </p:set>
                                     <p:animEffect transition="in" filter="dissolve">
                                       <p:cBhvr>
-                                        <p:cTn id="21" dur="1000"/>
-                                        <p:tgtEl>
-                                          <p:spTgt spid="3">
-                                            <p:txEl>
-                                              <p:pRg st="2" end="2"/>
-                                            </p:txEl>
-                                          </p:spTgt>
+                                        <p:cTn id="30" dur="500"/>
+                                        <p:tgtEl>
+                                          <p:spTgt spid="5"/>
                                         </p:tgtEl>
                                       </p:cBhvr>
                                     </p:animEffect>
@@ -13866,260 +14513,34 @@
                     </p:cTn>
                   </p:par>
                   <p:par>
-                    <p:cTn id="22" fill="hold">
+                    <p:cTn id="31" fill="hold">
                       <p:stCondLst>
                         <p:cond delay="indefinite"/>
                       </p:stCondLst>
                       <p:childTnLst>
                         <p:par>
-                          <p:cTn id="23" fill="hold">
+                          <p:cTn id="32" fill="hold">
                             <p:stCondLst>
                               <p:cond delay="0"/>
                             </p:stCondLst>
                             <p:childTnLst>
                               <p:par>
-                                <p:cTn id="24" presetID="9" presetClass="exit" presetSubtype="0" fill="hold" grpId="1" nodeType="clickEffect">
+                                <p:cTn id="33" presetID="9" presetClass="exit" presetSubtype="0" fill="hold" nodeType="clickEffect">
                                   <p:stCondLst>
                                     <p:cond delay="0"/>
                                   </p:stCondLst>
                                   <p:childTnLst>
                                     <p:animEffect transition="out" filter="dissolve">
                                       <p:cBhvr>
-                                        <p:cTn id="25" dur="500"/>
-                                        <p:tgtEl>
-                                          <p:spTgt spid="2"/>
+                                        <p:cTn id="34" dur="500"/>
+                                        <p:tgtEl>
+                                          <p:spTgt spid="5"/>
                                         </p:tgtEl>
                                       </p:cBhvr>
                                     </p:animEffect>
                                     <p:set>
                                       <p:cBhvr>
-                                        <p:cTn id="26" dur="1" fill="hold">
-                                          <p:stCondLst>
-                                            <p:cond delay="499"/>
-                                          </p:stCondLst>
-                                        </p:cTn>
-                                        <p:tgtEl>
-                                          <p:spTgt spid="2"/>
-                                        </p:tgtEl>
-                                        <p:attrNameLst>
-                                          <p:attrName>style.visibility</p:attrName>
-                                        </p:attrNameLst>
-                                      </p:cBhvr>
-                                      <p:to>
-                                        <p:strVal val="hidden"/>
-                                      </p:to>
-                                    </p:set>
-                                  </p:childTnLst>
-                                </p:cTn>
-                              </p:par>
-                              <p:par>
-                                <p:cTn id="27" presetID="9" presetClass="exit" presetSubtype="0" fill="hold" grpId="1" nodeType="withEffect">
-                                  <p:stCondLst>
-                                    <p:cond delay="0"/>
-                                  </p:stCondLst>
-                                  <p:childTnLst>
-                                    <p:animEffect transition="out" filter="dissolve">
-                                      <p:cBhvr>
-                                        <p:cTn id="28" dur="500"/>
-                                        <p:tgtEl>
-                                          <p:spTgt spid="3">
-                                            <p:txEl>
-                                              <p:pRg st="0" end="0"/>
-                                            </p:txEl>
-                                          </p:spTgt>
-                                        </p:tgtEl>
-                                      </p:cBhvr>
-                                    </p:animEffect>
-                                    <p:set>
-                                      <p:cBhvr>
-                                        <p:cTn id="29" dur="1" fill="hold">
-                                          <p:stCondLst>
-                                            <p:cond delay="499"/>
-                                          </p:stCondLst>
-                                        </p:cTn>
-                                        <p:tgtEl>
-                                          <p:spTgt spid="3">
-                                            <p:txEl>
-                                              <p:pRg st="0" end="0"/>
-                                            </p:txEl>
-                                          </p:spTgt>
-                                        </p:tgtEl>
-                                        <p:attrNameLst>
-                                          <p:attrName>style.visibility</p:attrName>
-                                        </p:attrNameLst>
-                                      </p:cBhvr>
-                                      <p:to>
-                                        <p:strVal val="hidden"/>
-                                      </p:to>
-                                    </p:set>
-                                  </p:childTnLst>
-                                </p:cTn>
-                              </p:par>
-                              <p:par>
-                                <p:cTn id="30" presetID="9" presetClass="exit" presetSubtype="0" fill="hold" grpId="1" nodeType="withEffect">
-                                  <p:stCondLst>
-                                    <p:cond delay="0"/>
-                                  </p:stCondLst>
-                                  <p:childTnLst>
-                                    <p:animEffect transition="out" filter="dissolve">
-                                      <p:cBhvr>
-                                        <p:cTn id="31" dur="500"/>
-                                        <p:tgtEl>
-                                          <p:spTgt spid="3">
-                                            <p:txEl>
-                                              <p:pRg st="1" end="1"/>
-                                            </p:txEl>
-                                          </p:spTgt>
-                                        </p:tgtEl>
-                                      </p:cBhvr>
-                                    </p:animEffect>
-                                    <p:set>
-                                      <p:cBhvr>
-                                        <p:cTn id="32" dur="1" fill="hold">
-                                          <p:stCondLst>
-                                            <p:cond delay="499"/>
-                                          </p:stCondLst>
-                                        </p:cTn>
-                                        <p:tgtEl>
-                                          <p:spTgt spid="3">
-                                            <p:txEl>
-                                              <p:pRg st="1" end="1"/>
-                                            </p:txEl>
-                                          </p:spTgt>
-                                        </p:tgtEl>
-                                        <p:attrNameLst>
-                                          <p:attrName>style.visibility</p:attrName>
-                                        </p:attrNameLst>
-                                      </p:cBhvr>
-                                      <p:to>
-                                        <p:strVal val="hidden"/>
-                                      </p:to>
-                                    </p:set>
-                                  </p:childTnLst>
-                                </p:cTn>
-                              </p:par>
-                              <p:par>
-                                <p:cTn id="33" presetID="9" presetClass="exit" presetSubtype="0" fill="hold" grpId="1" nodeType="withEffect">
-                                  <p:stCondLst>
-                                    <p:cond delay="0"/>
-                                  </p:stCondLst>
-                                  <p:childTnLst>
-                                    <p:animEffect transition="out" filter="dissolve">
-                                      <p:cBhvr>
-                                        <p:cTn id="34" dur="500"/>
-                                        <p:tgtEl>
-                                          <p:spTgt spid="3">
-                                            <p:txEl>
-                                              <p:pRg st="2" end="2"/>
-                                            </p:txEl>
-                                          </p:spTgt>
-                                        </p:tgtEl>
-                                      </p:cBhvr>
-                                    </p:animEffect>
-                                    <p:set>
-                                      <p:cBhvr>
                                         <p:cTn id="35" dur="1" fill="hold">
-                                          <p:stCondLst>
-                                            <p:cond delay="499"/>
-                                          </p:stCondLst>
-                                        </p:cTn>
-                                        <p:tgtEl>
-                                          <p:spTgt spid="3">
-                                            <p:txEl>
-                                              <p:pRg st="2" end="2"/>
-                                            </p:txEl>
-                                          </p:spTgt>
-                                        </p:tgtEl>
-                                        <p:attrNameLst>
-                                          <p:attrName>style.visibility</p:attrName>
-                                        </p:attrNameLst>
-                                      </p:cBhvr>
-                                      <p:to>
-                                        <p:strVal val="hidden"/>
-                                      </p:to>
-                                    </p:set>
-                                  </p:childTnLst>
-                                </p:cTn>
-                              </p:par>
-                            </p:childTnLst>
-                          </p:cTn>
-                        </p:par>
-                        <p:par>
-                          <p:cTn id="36" fill="hold">
-                            <p:stCondLst>
-                              <p:cond delay="500"/>
-                            </p:stCondLst>
-                            <p:childTnLst>
-                              <p:par>
-                                <p:cTn id="37" presetID="9" presetClass="entr" presetSubtype="0" fill="hold" nodeType="afterEffect">
-                                  <p:stCondLst>
-                                    <p:cond delay="0"/>
-                                  </p:stCondLst>
-                                  <p:childTnLst>
-                                    <p:set>
-                                      <p:cBhvr>
-                                        <p:cTn id="38" dur="1" fill="hold">
-                                          <p:stCondLst>
-                                            <p:cond delay="0"/>
-                                          </p:stCondLst>
-                                        </p:cTn>
-                                        <p:tgtEl>
-                                          <p:spTgt spid="5"/>
-                                        </p:tgtEl>
-                                        <p:attrNameLst>
-                                          <p:attrName>style.visibility</p:attrName>
-                                        </p:attrNameLst>
-                                      </p:cBhvr>
-                                      <p:to>
-                                        <p:strVal val="visible"/>
-                                      </p:to>
-                                    </p:set>
-                                    <p:animEffect transition="in" filter="dissolve">
-                                      <p:cBhvr>
-                                        <p:cTn id="39" dur="500"/>
-                                        <p:tgtEl>
-                                          <p:spTgt spid="5"/>
-                                        </p:tgtEl>
-                                      </p:cBhvr>
-                                    </p:animEffect>
-                                  </p:childTnLst>
-                                </p:cTn>
-                              </p:par>
-                            </p:childTnLst>
-                          </p:cTn>
-                        </p:par>
-                      </p:childTnLst>
-                    </p:cTn>
-                  </p:par>
-                  <p:par>
-                    <p:cTn id="40" fill="hold">
-                      <p:stCondLst>
-                        <p:cond delay="indefinite"/>
-                      </p:stCondLst>
-                      <p:childTnLst>
-                        <p:par>
-                          <p:cTn id="41" fill="hold">
-                            <p:stCondLst>
-                              <p:cond delay="0"/>
-                            </p:stCondLst>
-                            <p:childTnLst>
-                              <p:par>
-                                <p:cTn id="42" presetID="9" presetClass="exit" presetSubtype="0" fill="hold" nodeType="clickEffect">
-                                  <p:stCondLst>
-                                    <p:cond delay="0"/>
-                                  </p:stCondLst>
-                                  <p:childTnLst>
-                                    <p:animEffect transition="out" filter="dissolve">
-                                      <p:cBhvr>
-                                        <p:cTn id="43" dur="500"/>
-                                        <p:tgtEl>
-                                          <p:spTgt spid="5"/>
-                                        </p:tgtEl>
-                                      </p:cBhvr>
-                                    </p:animEffect>
-                                    <p:set>
-                                      <p:cBhvr>
-                                        <p:cTn id="44" dur="1" fill="hold">
                                           <p:stCondLst>
                                             <p:cond delay="499"/>
                                           </p:stCondLst>
@@ -15176,6 +15597,149 @@
           <a:chExt cx="0" cy="0"/>
         </a:xfrm>
       </p:grpSpPr>
+      <p:pic>
+        <p:nvPicPr>
+          <p:cNvPr id="4" name="Picture 3"/>
+          <p:cNvPicPr>
+            <a:picLocks noChangeAspect="1"/>
+          </p:cNvPicPr>
+          <p:nvPr/>
+        </p:nvPicPr>
+        <p:blipFill>
+          <a:blip r:embed="rId2">
+            <a:extLst>
+              <a:ext uri="{28A0092B-C50C-407E-A947-70E740481C1C}">
+                <a14:useLocalDpi xmlns:a14="http://schemas.microsoft.com/office/drawing/2010/main" val="0"/>
+              </a:ext>
+            </a:extLst>
+          </a:blip>
+          <a:stretch>
+            <a:fillRect/>
+          </a:stretch>
+        </p:blipFill>
+        <p:spPr>
+          <a:xfrm>
+            <a:off x="1308100" y="0"/>
+            <a:ext cx="9574401" cy="6858000"/>
+          </a:xfrm>
+          <a:prstGeom prst="rect">
+            <a:avLst/>
+          </a:prstGeom>
+        </p:spPr>
+      </p:pic>
+    </p:spTree>
+    <p:extLst>
+      <p:ext uri="{BB962C8B-B14F-4D97-AF65-F5344CB8AC3E}">
+        <p14:creationId xmlns:p14="http://schemas.microsoft.com/office/powerpoint/2010/main" val="671056082"/>
+      </p:ext>
+    </p:extLst>
+  </p:cSld>
+  <p:clrMapOvr>
+    <a:masterClrMapping/>
+  </p:clrMapOvr>
+  <p:timing>
+    <p:tnLst>
+      <p:par>
+        <p:cTn id="1" dur="indefinite" restart="never" nodeType="tmRoot">
+          <p:childTnLst>
+            <p:seq concurrent="1" nextAc="seek">
+              <p:cTn id="2" dur="indefinite" nodeType="mainSeq">
+                <p:childTnLst>
+                  <p:par>
+                    <p:cTn id="3" fill="hold">
+                      <p:stCondLst>
+                        <p:cond delay="indefinite"/>
+                      </p:stCondLst>
+                      <p:childTnLst>
+                        <p:par>
+                          <p:cTn id="4" fill="hold">
+                            <p:stCondLst>
+                              <p:cond delay="0"/>
+                            </p:stCondLst>
+                            <p:childTnLst>
+                              <p:par>
+                                <p:cTn id="5" presetID="9" presetClass="entr" presetSubtype="0" fill="hold" nodeType="clickEffect">
+                                  <p:stCondLst>
+                                    <p:cond delay="0"/>
+                                  </p:stCondLst>
+                                  <p:childTnLst>
+                                    <p:set>
+                                      <p:cBhvr>
+                                        <p:cTn id="6" dur="1" fill="hold">
+                                          <p:stCondLst>
+                                            <p:cond delay="0"/>
+                                          </p:stCondLst>
+                                        </p:cTn>
+                                        <p:tgtEl>
+                                          <p:spTgt spid="4"/>
+                                        </p:tgtEl>
+                                        <p:attrNameLst>
+                                          <p:attrName>style.visibility</p:attrName>
+                                        </p:attrNameLst>
+                                      </p:cBhvr>
+                                      <p:to>
+                                        <p:strVal val="visible"/>
+                                      </p:to>
+                                    </p:set>
+                                    <p:animEffect transition="in" filter="dissolve">
+                                      <p:cBhvr>
+                                        <p:cTn id="7" dur="500"/>
+                                        <p:tgtEl>
+                                          <p:spTgt spid="4"/>
+                                        </p:tgtEl>
+                                      </p:cBhvr>
+                                    </p:animEffect>
+                                  </p:childTnLst>
+                                </p:cTn>
+                              </p:par>
+                            </p:childTnLst>
+                          </p:cTn>
+                        </p:par>
+                      </p:childTnLst>
+                    </p:cTn>
+                  </p:par>
+                </p:childTnLst>
+              </p:cTn>
+              <p:prevCondLst>
+                <p:cond evt="onPrev" delay="0">
+                  <p:tgtEl>
+                    <p:sldTgt/>
+                  </p:tgtEl>
+                </p:cond>
+              </p:prevCondLst>
+              <p:nextCondLst>
+                <p:cond evt="onNext" delay="0">
+                  <p:tgtEl>
+                    <p:sldTgt/>
+                  </p:tgtEl>
+                </p:cond>
+              </p:nextCondLst>
+            </p:seq>
+          </p:childTnLst>
+        </p:cTn>
+      </p:par>
+    </p:tnLst>
+  </p:timing>
+</p:sld>
+</file>
+
+<file path=ppt/slides/slide9.xml><?xml version="1.0" encoding="utf-8"?>
+<p:sld xmlns:a="http://schemas.openxmlformats.org/drawingml/2006/main" xmlns:r="http://schemas.openxmlformats.org/officeDocument/2006/relationships" xmlns:p="http://schemas.openxmlformats.org/presentationml/2006/main">
+  <p:cSld>
+    <p:spTree>
+      <p:nvGrpSpPr>
+        <p:cNvPr id="1" name=""/>
+        <p:cNvGrpSpPr/>
+        <p:nvPr/>
+      </p:nvGrpSpPr>
+      <p:grpSpPr>
+        <a:xfrm>
+          <a:off x="0" y="0"/>
+          <a:ext cx="0" cy="0"/>
+          <a:chOff x="0" y="0"/>
+          <a:chExt cx="0" cy="0"/>
+        </a:xfrm>
+      </p:grpSpPr>
       <p:sp>
         <p:nvSpPr>
           <p:cNvPr id="2" name="Title 1"/>
@@ -15540,555 +16104,6 @@
                                         <p:cTn id="25" dur="500"/>
                                         <p:tgtEl>
                                           <p:spTgt spid="3"/>
-                                        </p:tgtEl>
-                                      </p:cBhvr>
-                                    </p:animEffect>
-                                  </p:childTnLst>
-                                </p:cTn>
-                              </p:par>
-                            </p:childTnLst>
-                          </p:cTn>
-                        </p:par>
-                      </p:childTnLst>
-                    </p:cTn>
-                  </p:par>
-                </p:childTnLst>
-              </p:cTn>
-              <p:prevCondLst>
-                <p:cond evt="onPrev" delay="0">
-                  <p:tgtEl>
-                    <p:sldTgt/>
-                  </p:tgtEl>
-                </p:cond>
-              </p:prevCondLst>
-              <p:nextCondLst>
-                <p:cond evt="onNext" delay="0">
-                  <p:tgtEl>
-                    <p:sldTgt/>
-                  </p:tgtEl>
-                </p:cond>
-              </p:nextCondLst>
-            </p:seq>
-          </p:childTnLst>
-        </p:cTn>
-      </p:par>
-    </p:tnLst>
-    <p:bldLst>
-      <p:bldP spid="2" grpId="0"/>
-      <p:bldP spid="2" grpId="1"/>
-    </p:bldLst>
-  </p:timing>
-</p:sld>
-</file>
-
-<file path=ppt/slides/slide9.xml><?xml version="1.0" encoding="utf-8"?>
-<p:sld xmlns:a="http://schemas.openxmlformats.org/drawingml/2006/main" xmlns:r="http://schemas.openxmlformats.org/officeDocument/2006/relationships" xmlns:p="http://schemas.openxmlformats.org/presentationml/2006/main">
-  <p:cSld>
-    <p:spTree>
-      <p:nvGrpSpPr>
-        <p:cNvPr id="1" name=""/>
-        <p:cNvGrpSpPr/>
-        <p:nvPr/>
-      </p:nvGrpSpPr>
-      <p:grpSpPr>
-        <a:xfrm>
-          <a:off x="0" y="0"/>
-          <a:ext cx="0" cy="0"/>
-          <a:chOff x="0" y="0"/>
-          <a:chExt cx="0" cy="0"/>
-        </a:xfrm>
-      </p:grpSpPr>
-      <p:sp>
-        <p:nvSpPr>
-          <p:cNvPr id="2" name="Title 1"/>
-          <p:cNvSpPr>
-            <a:spLocks noGrp="1"/>
-          </p:cNvSpPr>
-          <p:nvPr>
-            <p:ph type="title"/>
-          </p:nvPr>
-        </p:nvSpPr>
-        <p:spPr>
-          <a:xfrm>
-            <a:off x="821267" y="2566459"/>
-            <a:ext cx="10515600" cy="1325563"/>
-          </a:xfrm>
-        </p:spPr>
-        <p:txBody>
-          <a:bodyPr>
-            <a:normAutofit fontScale="90000"/>
-          </a:bodyPr>
-          <a:lstStyle/>
-          <a:p>
-            <a:pPr algn="ctr"/>
-            <a:r>
-              <a:rPr lang="en-US" dirty="0">
-                <a:solidFill>
-                  <a:schemeClr val="bg2">
-                    <a:lumMod val="75000"/>
-                  </a:schemeClr>
-                </a:solidFill>
-              </a:rPr>
-              <a:t>Do lighting conditions have an effect on accidents and severity? </a:t>
-            </a:r>
-          </a:p>
-        </p:txBody>
-      </p:sp>
-      <p:pic>
-        <p:nvPicPr>
-          <p:cNvPr id="5" name="Picture 4"/>
-          <p:cNvPicPr>
-            <a:picLocks noChangeAspect="1"/>
-          </p:cNvPicPr>
-          <p:nvPr/>
-        </p:nvPicPr>
-        <p:blipFill>
-          <a:blip r:embed="rId3">
-            <a:extLst>
-              <a:ext uri="{28A0092B-C50C-407E-A947-70E740481C1C}">
-                <a14:useLocalDpi xmlns:a14="http://schemas.microsoft.com/office/drawing/2010/main" val="0"/>
-              </a:ext>
-            </a:extLst>
-          </a:blip>
-          <a:stretch>
-            <a:fillRect/>
-          </a:stretch>
-        </p:blipFill>
-        <p:spPr>
-          <a:xfrm>
-            <a:off x="935567" y="0"/>
-            <a:ext cx="10287000" cy="6858000"/>
-          </a:xfrm>
-          <a:prstGeom prst="rect">
-            <a:avLst/>
-          </a:prstGeom>
-        </p:spPr>
-      </p:pic>
-      <p:pic>
-        <p:nvPicPr>
-          <p:cNvPr id="6" name="Picture 5"/>
-          <p:cNvPicPr>
-            <a:picLocks noChangeAspect="1"/>
-          </p:cNvPicPr>
-          <p:nvPr/>
-        </p:nvPicPr>
-        <p:blipFill>
-          <a:blip r:embed="rId4">
-            <a:extLst>
-              <a:ext uri="{28A0092B-C50C-407E-A947-70E740481C1C}">
-                <a14:useLocalDpi xmlns:a14="http://schemas.microsoft.com/office/drawing/2010/main" val="0"/>
-              </a:ext>
-            </a:extLst>
-          </a:blip>
-          <a:stretch>
-            <a:fillRect/>
-          </a:stretch>
-        </p:blipFill>
-        <p:spPr>
-          <a:xfrm>
-            <a:off x="520700" y="660400"/>
-            <a:ext cx="11150600" cy="5537200"/>
-          </a:xfrm>
-          <a:prstGeom prst="rect">
-            <a:avLst/>
-          </a:prstGeom>
-        </p:spPr>
-      </p:pic>
-      <p:pic>
-        <p:nvPicPr>
-          <p:cNvPr id="7" name="Picture 6"/>
-          <p:cNvPicPr>
-            <a:picLocks noChangeAspect="1"/>
-          </p:cNvPicPr>
-          <p:nvPr/>
-        </p:nvPicPr>
-        <p:blipFill>
-          <a:blip r:embed="rId5">
-            <a:extLst>
-              <a:ext uri="{28A0092B-C50C-407E-A947-70E740481C1C}">
-                <a14:useLocalDpi xmlns:a14="http://schemas.microsoft.com/office/drawing/2010/main" val="0"/>
-              </a:ext>
-            </a:extLst>
-          </a:blip>
-          <a:stretch>
-            <a:fillRect/>
-          </a:stretch>
-        </p:blipFill>
-        <p:spPr>
-          <a:xfrm>
-            <a:off x="666750" y="1771650"/>
-            <a:ext cx="10858500" cy="3314700"/>
-          </a:xfrm>
-          <a:prstGeom prst="rect">
-            <a:avLst/>
-          </a:prstGeom>
-        </p:spPr>
-      </p:pic>
-    </p:spTree>
-    <p:extLst>
-      <p:ext uri="{BB962C8B-B14F-4D97-AF65-F5344CB8AC3E}">
-        <p14:creationId xmlns:p14="http://schemas.microsoft.com/office/powerpoint/2010/main" val="1476045322"/>
-      </p:ext>
-    </p:extLst>
-  </p:cSld>
-  <p:clrMapOvr>
-    <a:masterClrMapping/>
-  </p:clrMapOvr>
-  <mc:AlternateContent xmlns:mc="http://schemas.openxmlformats.org/markup-compatibility/2006" xmlns:p14="http://schemas.microsoft.com/office/powerpoint/2010/main">
-    <mc:Choice Requires="p14">
-      <p:transition spd="med" p14:dur="700">
-        <p:fade/>
-      </p:transition>
-    </mc:Choice>
-    <mc:Fallback xmlns="">
-      <p:transition spd="med">
-        <p:fade/>
-      </p:transition>
-    </mc:Fallback>
-  </mc:AlternateContent>
-  <p:timing>
-    <p:tnLst>
-      <p:par>
-        <p:cTn id="1" dur="indefinite" restart="never" nodeType="tmRoot">
-          <p:childTnLst>
-            <p:seq concurrent="1" nextAc="seek">
-              <p:cTn id="2" dur="indefinite" nodeType="mainSeq">
-                <p:childTnLst>
-                  <p:par>
-                    <p:cTn id="3" fill="hold">
-                      <p:stCondLst>
-                        <p:cond delay="indefinite"/>
-                        <p:cond evt="onBegin" delay="0">
-                          <p:tn val="2"/>
-                        </p:cond>
-                      </p:stCondLst>
-                      <p:childTnLst>
-                        <p:par>
-                          <p:cTn id="4" fill="hold">
-                            <p:stCondLst>
-                              <p:cond delay="0"/>
-                            </p:stCondLst>
-                            <p:childTnLst>
-                              <p:par>
-                                <p:cTn id="5" presetID="9" presetClass="entr" presetSubtype="0" fill="hold" grpId="0" nodeType="withEffect">
-                                  <p:stCondLst>
-                                    <p:cond delay="0"/>
-                                  </p:stCondLst>
-                                  <p:childTnLst>
-                                    <p:set>
-                                      <p:cBhvr>
-                                        <p:cTn id="6" dur="1" fill="hold">
-                                          <p:stCondLst>
-                                            <p:cond delay="0"/>
-                                          </p:stCondLst>
-                                        </p:cTn>
-                                        <p:tgtEl>
-                                          <p:spTgt spid="2"/>
-                                        </p:tgtEl>
-                                        <p:attrNameLst>
-                                          <p:attrName>style.visibility</p:attrName>
-                                        </p:attrNameLst>
-                                      </p:cBhvr>
-                                      <p:to>
-                                        <p:strVal val="visible"/>
-                                      </p:to>
-                                    </p:set>
-                                    <p:animEffect transition="in" filter="dissolve">
-                                      <p:cBhvr>
-                                        <p:cTn id="7" dur="500"/>
-                                        <p:tgtEl>
-                                          <p:spTgt spid="2"/>
-                                        </p:tgtEl>
-                                      </p:cBhvr>
-                                    </p:animEffect>
-                                  </p:childTnLst>
-                                </p:cTn>
-                              </p:par>
-                            </p:childTnLst>
-                          </p:cTn>
-                        </p:par>
-                      </p:childTnLst>
-                    </p:cTn>
-                  </p:par>
-                  <p:par>
-                    <p:cTn id="8" fill="hold">
-                      <p:stCondLst>
-                        <p:cond delay="indefinite"/>
-                      </p:stCondLst>
-                      <p:childTnLst>
-                        <p:par>
-                          <p:cTn id="9" fill="hold">
-                            <p:stCondLst>
-                              <p:cond delay="0"/>
-                            </p:stCondLst>
-                            <p:childTnLst>
-                              <p:par>
-                                <p:cTn id="10" presetID="9" presetClass="exit" presetSubtype="0" fill="hold" grpId="1" nodeType="clickEffect">
-                                  <p:stCondLst>
-                                    <p:cond delay="0"/>
-                                  </p:stCondLst>
-                                  <p:childTnLst>
-                                    <p:animEffect transition="out" filter="dissolve">
-                                      <p:cBhvr>
-                                        <p:cTn id="11" dur="500"/>
-                                        <p:tgtEl>
-                                          <p:spTgt spid="2"/>
-                                        </p:tgtEl>
-                                      </p:cBhvr>
-                                    </p:animEffect>
-                                    <p:set>
-                                      <p:cBhvr>
-                                        <p:cTn id="12" dur="1" fill="hold">
-                                          <p:stCondLst>
-                                            <p:cond delay="499"/>
-                                          </p:stCondLst>
-                                        </p:cTn>
-                                        <p:tgtEl>
-                                          <p:spTgt spid="2"/>
-                                        </p:tgtEl>
-                                        <p:attrNameLst>
-                                          <p:attrName>style.visibility</p:attrName>
-                                        </p:attrNameLst>
-                                      </p:cBhvr>
-                                      <p:to>
-                                        <p:strVal val="hidden"/>
-                                      </p:to>
-                                    </p:set>
-                                  </p:childTnLst>
-                                </p:cTn>
-                              </p:par>
-                            </p:childTnLst>
-                          </p:cTn>
-                        </p:par>
-                        <p:par>
-                          <p:cTn id="13" fill="hold">
-                            <p:stCondLst>
-                              <p:cond delay="500"/>
-                            </p:stCondLst>
-                            <p:childTnLst>
-                              <p:par>
-                                <p:cTn id="14" presetID="9" presetClass="entr" presetSubtype="0" fill="hold" nodeType="afterEffect">
-                                  <p:stCondLst>
-                                    <p:cond delay="0"/>
-                                  </p:stCondLst>
-                                  <p:childTnLst>
-                                    <p:set>
-                                      <p:cBhvr>
-                                        <p:cTn id="15" dur="1" fill="hold">
-                                          <p:stCondLst>
-                                            <p:cond delay="0"/>
-                                          </p:stCondLst>
-                                        </p:cTn>
-                                        <p:tgtEl>
-                                          <p:spTgt spid="5"/>
-                                        </p:tgtEl>
-                                        <p:attrNameLst>
-                                          <p:attrName>style.visibility</p:attrName>
-                                        </p:attrNameLst>
-                                      </p:cBhvr>
-                                      <p:to>
-                                        <p:strVal val="visible"/>
-                                      </p:to>
-                                    </p:set>
-                                    <p:animEffect transition="in" filter="dissolve">
-                                      <p:cBhvr>
-                                        <p:cTn id="16" dur="500"/>
-                                        <p:tgtEl>
-                                          <p:spTgt spid="5"/>
-                                        </p:tgtEl>
-                                      </p:cBhvr>
-                                    </p:animEffect>
-                                  </p:childTnLst>
-                                </p:cTn>
-                              </p:par>
-                            </p:childTnLst>
-                          </p:cTn>
-                        </p:par>
-                      </p:childTnLst>
-                    </p:cTn>
-                  </p:par>
-                  <p:par>
-                    <p:cTn id="17" fill="hold">
-                      <p:stCondLst>
-                        <p:cond delay="indefinite"/>
-                      </p:stCondLst>
-                      <p:childTnLst>
-                        <p:par>
-                          <p:cTn id="18" fill="hold">
-                            <p:stCondLst>
-                              <p:cond delay="0"/>
-                            </p:stCondLst>
-                            <p:childTnLst>
-                              <p:par>
-                                <p:cTn id="19" presetID="9" presetClass="exit" presetSubtype="0" fill="hold" nodeType="clickEffect">
-                                  <p:stCondLst>
-                                    <p:cond delay="0"/>
-                                  </p:stCondLst>
-                                  <p:childTnLst>
-                                    <p:animEffect transition="out" filter="dissolve">
-                                      <p:cBhvr>
-                                        <p:cTn id="20" dur="500"/>
-                                        <p:tgtEl>
-                                          <p:spTgt spid="5"/>
-                                        </p:tgtEl>
-                                      </p:cBhvr>
-                                    </p:animEffect>
-                                    <p:set>
-                                      <p:cBhvr>
-                                        <p:cTn id="21" dur="1" fill="hold">
-                                          <p:stCondLst>
-                                            <p:cond delay="499"/>
-                                          </p:stCondLst>
-                                        </p:cTn>
-                                        <p:tgtEl>
-                                          <p:spTgt spid="5"/>
-                                        </p:tgtEl>
-                                        <p:attrNameLst>
-                                          <p:attrName>style.visibility</p:attrName>
-                                        </p:attrNameLst>
-                                      </p:cBhvr>
-                                      <p:to>
-                                        <p:strVal val="hidden"/>
-                                      </p:to>
-                                    </p:set>
-                                  </p:childTnLst>
-                                </p:cTn>
-                              </p:par>
-                            </p:childTnLst>
-                          </p:cTn>
-                        </p:par>
-                        <p:par>
-                          <p:cTn id="22" fill="hold">
-                            <p:stCondLst>
-                              <p:cond delay="500"/>
-                            </p:stCondLst>
-                            <p:childTnLst>
-                              <p:par>
-                                <p:cTn id="23" presetID="9" presetClass="entr" presetSubtype="0" fill="hold" nodeType="afterEffect">
-                                  <p:stCondLst>
-                                    <p:cond delay="0"/>
-                                  </p:stCondLst>
-                                  <p:childTnLst>
-                                    <p:set>
-                                      <p:cBhvr>
-                                        <p:cTn id="24" dur="1" fill="hold">
-                                          <p:stCondLst>
-                                            <p:cond delay="0"/>
-                                          </p:stCondLst>
-                                        </p:cTn>
-                                        <p:tgtEl>
-                                          <p:spTgt spid="6"/>
-                                        </p:tgtEl>
-                                        <p:attrNameLst>
-                                          <p:attrName>style.visibility</p:attrName>
-                                        </p:attrNameLst>
-                                      </p:cBhvr>
-                                      <p:to>
-                                        <p:strVal val="visible"/>
-                                      </p:to>
-                                    </p:set>
-                                    <p:animEffect transition="in" filter="dissolve">
-                                      <p:cBhvr>
-                                        <p:cTn id="25" dur="500"/>
-                                        <p:tgtEl>
-                                          <p:spTgt spid="6"/>
-                                        </p:tgtEl>
-                                      </p:cBhvr>
-                                    </p:animEffect>
-                                  </p:childTnLst>
-                                </p:cTn>
-                              </p:par>
-                            </p:childTnLst>
-                          </p:cTn>
-                        </p:par>
-                      </p:childTnLst>
-                    </p:cTn>
-                  </p:par>
-                  <p:par>
-                    <p:cTn id="26" fill="hold">
-                      <p:stCondLst>
-                        <p:cond delay="indefinite"/>
-                      </p:stCondLst>
-                      <p:childTnLst>
-                        <p:par>
-                          <p:cTn id="27" fill="hold">
-                            <p:stCondLst>
-                              <p:cond delay="0"/>
-                            </p:stCondLst>
-                            <p:childTnLst>
-                              <p:par>
-                                <p:cTn id="28" presetID="9" presetClass="exit" presetSubtype="0" fill="hold" nodeType="clickEffect">
-                                  <p:stCondLst>
-                                    <p:cond delay="0"/>
-                                  </p:stCondLst>
-                                  <p:childTnLst>
-                                    <p:animEffect transition="out" filter="dissolve">
-                                      <p:cBhvr>
-                                        <p:cTn id="29" dur="500"/>
-                                        <p:tgtEl>
-                                          <p:spTgt spid="6"/>
-                                        </p:tgtEl>
-                                      </p:cBhvr>
-                                    </p:animEffect>
-                                    <p:set>
-                                      <p:cBhvr>
-                                        <p:cTn id="30" dur="1" fill="hold">
-                                          <p:stCondLst>
-                                            <p:cond delay="499"/>
-                                          </p:stCondLst>
-                                        </p:cTn>
-                                        <p:tgtEl>
-                                          <p:spTgt spid="6"/>
-                                        </p:tgtEl>
-                                        <p:attrNameLst>
-                                          <p:attrName>style.visibility</p:attrName>
-                                        </p:attrNameLst>
-                                      </p:cBhvr>
-                                      <p:to>
-                                        <p:strVal val="hidden"/>
-                                      </p:to>
-                                    </p:set>
-                                  </p:childTnLst>
-                                </p:cTn>
-                              </p:par>
-                            </p:childTnLst>
-                          </p:cTn>
-                        </p:par>
-                        <p:par>
-                          <p:cTn id="31" fill="hold">
-                            <p:stCondLst>
-                              <p:cond delay="500"/>
-                            </p:stCondLst>
-                            <p:childTnLst>
-                              <p:par>
-                                <p:cTn id="32" presetID="9" presetClass="entr" presetSubtype="0" fill="hold" nodeType="afterEffect">
-                                  <p:stCondLst>
-                                    <p:cond delay="0"/>
-                                  </p:stCondLst>
-                                  <p:childTnLst>
-                                    <p:set>
-                                      <p:cBhvr>
-                                        <p:cTn id="33" dur="1" fill="hold">
-                                          <p:stCondLst>
-                                            <p:cond delay="0"/>
-                                          </p:stCondLst>
-                                        </p:cTn>
-                                        <p:tgtEl>
-                                          <p:spTgt spid="7"/>
-                                        </p:tgtEl>
-                                        <p:attrNameLst>
-                                          <p:attrName>style.visibility</p:attrName>
-                                        </p:attrNameLst>
-                                      </p:cBhvr>
-                                      <p:to>
-                                        <p:strVal val="visible"/>
-                                      </p:to>
-                                    </p:set>
-                                    <p:animEffect transition="in" filter="dissolve">
-                                      <p:cBhvr>
-                                        <p:cTn id="34" dur="500"/>
-                                        <p:tgtEl>
-                                          <p:spTgt spid="7"/>
                                         </p:tgtEl>
                                       </p:cBhvr>
                                     </p:animEffect>

</xml_diff>